<commit_message>
Update vignette and cheatsheet
</commit_message>
<xml_diff>
--- a/cheat_sheet/antares_cheat_sheet_en.pptx
+++ b/cheat_sheet/antares_cheat_sheet_en.pptx
@@ -243,7 +243,7 @@
           <a:p>
             <a:fld id="{DF67CDC5-8101-4B0E-AAFB-FAC6D687EBFB}" type="datetimeFigureOut">
               <a:rPr lang="fr-FR" smtClean="0"/>
-              <a:t>25/05/2016</a:t>
+              <a:t>21/06/2016</a:t>
             </a:fld>
             <a:endParaRPr lang="fr-FR"/>
           </a:p>
@@ -413,7 +413,7 @@
           <a:p>
             <a:fld id="{DF67CDC5-8101-4B0E-AAFB-FAC6D687EBFB}" type="datetimeFigureOut">
               <a:rPr lang="fr-FR" smtClean="0"/>
-              <a:t>25/05/2016</a:t>
+              <a:t>21/06/2016</a:t>
             </a:fld>
             <a:endParaRPr lang="fr-FR"/>
           </a:p>
@@ -593,7 +593,7 @@
           <a:p>
             <a:fld id="{DF67CDC5-8101-4B0E-AAFB-FAC6D687EBFB}" type="datetimeFigureOut">
               <a:rPr lang="fr-FR" smtClean="0"/>
-              <a:t>25/05/2016</a:t>
+              <a:t>21/06/2016</a:t>
             </a:fld>
             <a:endParaRPr lang="fr-FR"/>
           </a:p>
@@ -763,7 +763,7 @@
           <a:p>
             <a:fld id="{DF67CDC5-8101-4B0E-AAFB-FAC6D687EBFB}" type="datetimeFigureOut">
               <a:rPr lang="fr-FR" smtClean="0"/>
-              <a:t>25/05/2016</a:t>
+              <a:t>21/06/2016</a:t>
             </a:fld>
             <a:endParaRPr lang="fr-FR"/>
           </a:p>
@@ -1007,7 +1007,7 @@
           <a:p>
             <a:fld id="{DF67CDC5-8101-4B0E-AAFB-FAC6D687EBFB}" type="datetimeFigureOut">
               <a:rPr lang="fr-FR" smtClean="0"/>
-              <a:t>25/05/2016</a:t>
+              <a:t>21/06/2016</a:t>
             </a:fld>
             <a:endParaRPr lang="fr-FR"/>
           </a:p>
@@ -1239,7 +1239,7 @@
           <a:p>
             <a:fld id="{DF67CDC5-8101-4B0E-AAFB-FAC6D687EBFB}" type="datetimeFigureOut">
               <a:rPr lang="fr-FR" smtClean="0"/>
-              <a:t>25/05/2016</a:t>
+              <a:t>21/06/2016</a:t>
             </a:fld>
             <a:endParaRPr lang="fr-FR"/>
           </a:p>
@@ -1606,7 +1606,7 @@
           <a:p>
             <a:fld id="{DF67CDC5-8101-4B0E-AAFB-FAC6D687EBFB}" type="datetimeFigureOut">
               <a:rPr lang="fr-FR" smtClean="0"/>
-              <a:t>25/05/2016</a:t>
+              <a:t>21/06/2016</a:t>
             </a:fld>
             <a:endParaRPr lang="fr-FR"/>
           </a:p>
@@ -1724,7 +1724,7 @@
           <a:p>
             <a:fld id="{DF67CDC5-8101-4B0E-AAFB-FAC6D687EBFB}" type="datetimeFigureOut">
               <a:rPr lang="fr-FR" smtClean="0"/>
-              <a:t>25/05/2016</a:t>
+              <a:t>21/06/2016</a:t>
             </a:fld>
             <a:endParaRPr lang="fr-FR"/>
           </a:p>
@@ -1819,7 +1819,7 @@
           <a:p>
             <a:fld id="{DF67CDC5-8101-4B0E-AAFB-FAC6D687EBFB}" type="datetimeFigureOut">
               <a:rPr lang="fr-FR" smtClean="0"/>
-              <a:t>25/05/2016</a:t>
+              <a:t>21/06/2016</a:t>
             </a:fld>
             <a:endParaRPr lang="fr-FR"/>
           </a:p>
@@ -2096,7 +2096,7 @@
           <a:p>
             <a:fld id="{DF67CDC5-8101-4B0E-AAFB-FAC6D687EBFB}" type="datetimeFigureOut">
               <a:rPr lang="fr-FR" smtClean="0"/>
-              <a:t>25/05/2016</a:t>
+              <a:t>21/06/2016</a:t>
             </a:fld>
             <a:endParaRPr lang="fr-FR"/>
           </a:p>
@@ -2353,7 +2353,7 @@
           <a:p>
             <a:fld id="{DF67CDC5-8101-4B0E-AAFB-FAC6D687EBFB}" type="datetimeFigureOut">
               <a:rPr lang="fr-FR" smtClean="0"/>
-              <a:t>25/05/2016</a:t>
+              <a:t>21/06/2016</a:t>
             </a:fld>
             <a:endParaRPr lang="fr-FR"/>
           </a:p>
@@ -2566,7 +2566,7 @@
           <a:p>
             <a:fld id="{DF67CDC5-8101-4B0E-AAFB-FAC6D687EBFB}" type="datetimeFigureOut">
               <a:rPr lang="fr-FR" smtClean="0"/>
-              <a:t>25/05/2016</a:t>
+              <a:t>21/06/2016</a:t>
             </a:fld>
             <a:endParaRPr lang="fr-FR"/>
           </a:p>
@@ -3010,19 +3010,15 @@
           <a:p>
             <a:pPr algn="ctr"/>
             <a:r>
-              <a:rPr lang="en-US" sz="2000" b="1" dirty="0" smtClean="0"/>
-              <a:t>The</a:t>
-            </a:r>
-            <a:r>
-              <a:rPr lang="en-US" sz="2000" b="1" dirty="0" smtClean="0"/>
-              <a:t> « </a:t>
-            </a:r>
-            <a:r>
-              <a:rPr lang="en-US" sz="2000" b="1" dirty="0" err="1" smtClean="0"/>
-              <a:t>antares</a:t>
-            </a:r>
-            <a:r>
-              <a:rPr lang="en-US" sz="2000" b="1" dirty="0" smtClean="0"/>
+              <a:rPr lang="en-US" b="1" dirty="0" smtClean="0"/>
+              <a:t>The « </a:t>
+            </a:r>
+            <a:r>
+              <a:rPr lang="en-US" b="1" dirty="0" err="1" smtClean="0"/>
+              <a:t>antaresRead</a:t>
+            </a:r>
+            <a:r>
+              <a:rPr lang="en-US" b="1" dirty="0" smtClean="0"/>
               <a:t> » package</a:t>
             </a:r>
           </a:p>
@@ -3075,13 +3071,6 @@
               </a:rPr>
               <a:t>francois.guillem@rte-france.com</a:t>
             </a:r>
-            <a:endParaRPr lang="en-US" sz="1000" dirty="0" smtClean="0">
-              <a:solidFill>
-                <a:schemeClr val="bg1">
-                  <a:lumMod val="50000"/>
-                </a:schemeClr>
-              </a:solidFill>
-            </a:endParaRPr>
           </a:p>
         </p:txBody>
       </p:sp>
@@ -3251,10 +3240,6 @@
               </a:rPr>
               <a:t>()</a:t>
             </a:r>
-            <a:endParaRPr lang="en-US" sz="800" dirty="0" smtClean="0">
-              <a:latin typeface="Courier New" panose="02070309020205020404" pitchFamily="49" charset="0"/>
-              <a:cs typeface="Courier New" panose="02070309020205020404" pitchFamily="49" charset="0"/>
-            </a:endParaRPr>
           </a:p>
         </p:txBody>
       </p:sp>
@@ -3810,7 +3795,35 @@
                 <a:latin typeface="Courier New" panose="02070309020205020404" pitchFamily="49" charset="0"/>
                 <a:cs typeface="Courier New" panose="02070309020205020404" pitchFamily="49" charset="0"/>
               </a:rPr>
-              <a:t>“path/antaresXXX.zip"</a:t>
+              <a:t>“</a:t>
+            </a:r>
+            <a:r>
+              <a:rPr kumimoji="0" lang="en-US" altLang="fr-FR" sz="800" b="0" i="0" u="none" strike="noStrike" cap="none" normalizeH="0" baseline="0" dirty="0" smtClean="0">
+                <a:ln>
+                  <a:noFill/>
+                </a:ln>
+                <a:solidFill>
+                  <a:srgbClr val="DD1144"/>
+                </a:solidFill>
+                <a:effectLst/>
+                <a:latin typeface="Courier New" panose="02070309020205020404" pitchFamily="49" charset="0"/>
+                <a:cs typeface="Courier New" panose="02070309020205020404" pitchFamily="49" charset="0"/>
+              </a:rPr>
+              <a:t>path/antaresReadXXX.zip</a:t>
+            </a:r>
+            <a:r>
+              <a:rPr kumimoji="0" lang="en-US" altLang="fr-FR" sz="800" b="0" i="0" u="none" strike="noStrike" cap="none" normalizeH="0" baseline="0" dirty="0" smtClean="0">
+                <a:ln>
+                  <a:noFill/>
+                </a:ln>
+                <a:solidFill>
+                  <a:srgbClr val="DD1144"/>
+                </a:solidFill>
+                <a:effectLst/>
+                <a:latin typeface="Courier New" panose="02070309020205020404" pitchFamily="49" charset="0"/>
+                <a:cs typeface="Courier New" panose="02070309020205020404" pitchFamily="49" charset="0"/>
+              </a:rPr>
+              <a:t>"</a:t>
             </a:r>
             <a:r>
               <a:rPr kumimoji="0" lang="en-US" altLang="fr-FR" sz="800" b="0" i="0" u="none" strike="noStrike" cap="none" normalizeH="0" baseline="0" dirty="0" smtClean="0">
@@ -4132,11 +4145,7 @@
           <a:p>
             <a:r>
               <a:rPr lang="en-US" sz="1000" dirty="0" smtClean="0"/>
-              <a:t>Parameter</a:t>
-            </a:r>
-            <a:r>
-              <a:rPr lang="en-US" sz="1000" dirty="0" smtClean="0"/>
-              <a:t> « </a:t>
+              <a:t>Parameter « </a:t>
             </a:r>
             <a:r>
               <a:rPr lang="en-US" sz="800" dirty="0" smtClean="0">
@@ -4335,7 +4344,7 @@
                 <a:latin typeface="Courier New" panose="02070309020205020404" pitchFamily="49" charset="0"/>
                 <a:cs typeface="Courier New" panose="02070309020205020404" pitchFamily="49" charset="0"/>
               </a:rPr>
-              <a:t>antares</a:t>
+              <a:t>antaresRead</a:t>
             </a:r>
             <a:r>
               <a:rPr kumimoji="0" lang="en-US" altLang="fr-FR" sz="1000" b="0" i="0" u="none" strike="noStrike" cap="none" normalizeH="0" baseline="0" dirty="0" smtClean="0">
@@ -4817,13 +4826,8 @@
           <a:p>
             <a:r>
               <a:rPr lang="en-US" b="1" dirty="0" smtClean="0"/>
-              <a:t>2. </a:t>
-            </a:r>
-            <a:r>
-              <a:rPr lang="en-US" b="1" dirty="0" smtClean="0"/>
-              <a:t>Read the results</a:t>
-            </a:r>
-            <a:endParaRPr lang="en-US" b="1" dirty="0" smtClean="0"/>
+              <a:t>2. Read the results</a:t>
+            </a:r>
           </a:p>
           <a:p>
             <a:endParaRPr lang="en-US" sz="1000" dirty="0" smtClean="0"/>
@@ -4843,11 +4847,7 @@
           <a:p>
             <a:r>
               <a:rPr lang="en-US" sz="1200" b="1" dirty="0" smtClean="0"/>
-              <a:t>Elements to retrieve</a:t>
-            </a:r>
-            <a:r>
-              <a:rPr lang="en-US" sz="1200" b="1" dirty="0" smtClean="0"/>
-              <a:t>:</a:t>
+              <a:t>Elements to retrieve:</a:t>
             </a:r>
           </a:p>
           <a:p>
@@ -4954,7 +4954,6 @@
               <a:rPr lang="en-US" sz="1000" dirty="0" smtClean="0"/>
               <a:t>to add miscellaneous productions</a:t>
             </a:r>
-            <a:endParaRPr lang="en-US" sz="1000" dirty="0" smtClean="0"/>
           </a:p>
           <a:p>
             <a:pPr marL="171450" indent="-171450">
@@ -4979,7 +4978,6 @@
               <a:rPr lang="en-US" sz="1000" dirty="0" smtClean="0"/>
               <a:t>to add the available capacity of thermal clusters</a:t>
             </a:r>
-            <a:endParaRPr lang="en-US" sz="1000" dirty="0" smtClean="0"/>
           </a:p>
           <a:p>
             <a:pPr marL="171450" indent="-171450">
@@ -5004,7 +5002,6 @@
               <a:rPr lang="en-US" sz="1000" dirty="0" smtClean="0"/>
               <a:t>to add the expected hydraulic storage power in the month</a:t>
             </a:r>
-            <a:endParaRPr lang="en-US" sz="1000" dirty="0" smtClean="0"/>
           </a:p>
           <a:p>
             <a:pPr marL="171450" indent="-171450">
@@ -5027,11 +5024,7 @@
             </a:r>
             <a:r>
               <a:rPr lang="en-US" sz="1000" dirty="0" smtClean="0"/>
-              <a:t>to add the maximal capacity of hydraulic storage production</a:t>
-            </a:r>
-            <a:r>
-              <a:rPr lang="en-US" sz="1000" dirty="0" smtClean="0"/>
-              <a:t> </a:t>
+              <a:t>to add the maximal capacity of hydraulic storage production </a:t>
             </a:r>
           </a:p>
           <a:p>
@@ -5050,7 +5043,6 @@
               <a:rPr lang="en-US" sz="1000" dirty="0" smtClean="0"/>
               <a:t>to add reserves</a:t>
             </a:r>
-            <a:endParaRPr lang="en-US" sz="1000" dirty="0" smtClean="0"/>
           </a:p>
           <a:p>
             <a:pPr marL="171450" indent="-171450">
@@ -5075,7 +5067,6 @@
               <a:rPr lang="en-US" sz="1000" dirty="0" smtClean="0"/>
               <a:t>to add technical features of the links</a:t>
             </a:r>
-            <a:endParaRPr lang="en-US" sz="1000" dirty="0" smtClean="0"/>
           </a:p>
           <a:p>
             <a:pPr marL="171450" indent="-171450">
@@ -5130,7 +5121,6 @@
               <a:rPr lang="en-US" sz="1000" dirty="0" smtClean="0"/>
               <a:t>to get results of the Monte-Carlo scenarios instead of the synthetic results</a:t>
             </a:r>
-            <a:endParaRPr lang="en-US" sz="1000" dirty="0" smtClean="0"/>
           </a:p>
           <a:p>
             <a:pPr marL="171450" indent="-171450">
@@ -5185,7 +5175,6 @@
               <a:rPr lang="en-US" sz="1000" dirty="0" smtClean="0"/>
               <a:t>to select only some columns of the results</a:t>
             </a:r>
-            <a:endParaRPr lang="en-US" sz="1000" dirty="0" smtClean="0"/>
           </a:p>
           <a:p>
             <a:pPr marL="171450" indent="-171450">
@@ -5210,7 +5199,6 @@
               <a:rPr lang="en-US" sz="1000" dirty="0" smtClean="0"/>
               <a:t>to change the time step (by default hourly time step)</a:t>
             </a:r>
-            <a:endParaRPr lang="en-US" sz="1000" dirty="0" smtClean="0"/>
           </a:p>
           <a:p>
             <a:endParaRPr lang="en-US" sz="1000" dirty="0"/>
@@ -7575,11 +7563,7 @@
           <a:p>
             <a:r>
               <a:rPr lang="en-US" b="1" dirty="0" smtClean="0"/>
-              <a:t>Other</a:t>
-            </a:r>
-            <a:r>
-              <a:rPr lang="en-US" b="1" dirty="0" smtClean="0"/>
-              <a:t> functions</a:t>
+              <a:t>Other functions</a:t>
             </a:r>
           </a:p>
           <a:p>

</xml_diff>